<commit_message>
add link to roadmap, and test what updates to pptx files look like
</commit_message>
<xml_diff>
--- a/Roadmap.pptx
+++ b/Roadmap.pptx
@@ -105,6 +105,11 @@
       </a:defRPr>
     </a:lvl9pPr>
   </p:defaultTextStyle>
+  <p:extLst>
+    <p:ext uri="{EFAFB233-063F-42B5-8137-9DF3F51BA10A}">
+      <p15:sldGuideLst xmlns:p15="http://schemas.microsoft.com/office/powerpoint/2012/main"/>
+    </p:ext>
+  </p:extLst>
 </p:presentation>
 </file>
 
@@ -255,7 +260,7 @@
           <a:p>
             <a:fld id="{9244CCC5-76A4-4057-B5CC-077AFF00554F}" type="datetimeFigureOut">
               <a:rPr lang="en-US" smtClean="0"/>
-              <a:t>10/20/2020</a:t>
+              <a:t>10/30/2020</a:t>
             </a:fld>
             <a:endParaRPr lang="en-US"/>
           </a:p>
@@ -453,7 +458,7 @@
           <a:p>
             <a:fld id="{9244CCC5-76A4-4057-B5CC-077AFF00554F}" type="datetimeFigureOut">
               <a:rPr lang="en-US" smtClean="0"/>
-              <a:t>10/20/2020</a:t>
+              <a:t>10/30/2020</a:t>
             </a:fld>
             <a:endParaRPr lang="en-US"/>
           </a:p>
@@ -661,7 +666,7 @@
           <a:p>
             <a:fld id="{9244CCC5-76A4-4057-B5CC-077AFF00554F}" type="datetimeFigureOut">
               <a:rPr lang="en-US" smtClean="0"/>
-              <a:t>10/20/2020</a:t>
+              <a:t>10/30/2020</a:t>
             </a:fld>
             <a:endParaRPr lang="en-US"/>
           </a:p>
@@ -859,7 +864,7 @@
           <a:p>
             <a:fld id="{9244CCC5-76A4-4057-B5CC-077AFF00554F}" type="datetimeFigureOut">
               <a:rPr lang="en-US" smtClean="0"/>
-              <a:t>10/20/2020</a:t>
+              <a:t>10/30/2020</a:t>
             </a:fld>
             <a:endParaRPr lang="en-US"/>
           </a:p>
@@ -1134,7 +1139,7 @@
           <a:p>
             <a:fld id="{9244CCC5-76A4-4057-B5CC-077AFF00554F}" type="datetimeFigureOut">
               <a:rPr lang="en-US" smtClean="0"/>
-              <a:t>10/20/2020</a:t>
+              <a:t>10/30/2020</a:t>
             </a:fld>
             <a:endParaRPr lang="en-US"/>
           </a:p>
@@ -1399,7 +1404,7 @@
           <a:p>
             <a:fld id="{9244CCC5-76A4-4057-B5CC-077AFF00554F}" type="datetimeFigureOut">
               <a:rPr lang="en-US" smtClean="0"/>
-              <a:t>10/20/2020</a:t>
+              <a:t>10/30/2020</a:t>
             </a:fld>
             <a:endParaRPr lang="en-US"/>
           </a:p>
@@ -1811,7 +1816,7 @@
           <a:p>
             <a:fld id="{9244CCC5-76A4-4057-B5CC-077AFF00554F}" type="datetimeFigureOut">
               <a:rPr lang="en-US" smtClean="0"/>
-              <a:t>10/20/2020</a:t>
+              <a:t>10/30/2020</a:t>
             </a:fld>
             <a:endParaRPr lang="en-US"/>
           </a:p>
@@ -1952,7 +1957,7 @@
           <a:p>
             <a:fld id="{9244CCC5-76A4-4057-B5CC-077AFF00554F}" type="datetimeFigureOut">
               <a:rPr lang="en-US" smtClean="0"/>
-              <a:t>10/20/2020</a:t>
+              <a:t>10/30/2020</a:t>
             </a:fld>
             <a:endParaRPr lang="en-US"/>
           </a:p>
@@ -2065,7 +2070,7 @@
           <a:p>
             <a:fld id="{9244CCC5-76A4-4057-B5CC-077AFF00554F}" type="datetimeFigureOut">
               <a:rPr lang="en-US" smtClean="0"/>
-              <a:t>10/20/2020</a:t>
+              <a:t>10/30/2020</a:t>
             </a:fld>
             <a:endParaRPr lang="en-US"/>
           </a:p>
@@ -2376,7 +2381,7 @@
           <a:p>
             <a:fld id="{9244CCC5-76A4-4057-B5CC-077AFF00554F}" type="datetimeFigureOut">
               <a:rPr lang="en-US" smtClean="0"/>
-              <a:t>10/20/2020</a:t>
+              <a:t>10/30/2020</a:t>
             </a:fld>
             <a:endParaRPr lang="en-US"/>
           </a:p>
@@ -2664,7 +2669,7 @@
           <a:p>
             <a:fld id="{9244CCC5-76A4-4057-B5CC-077AFF00554F}" type="datetimeFigureOut">
               <a:rPr lang="en-US" smtClean="0"/>
-              <a:t>10/20/2020</a:t>
+              <a:t>10/30/2020</a:t>
             </a:fld>
             <a:endParaRPr lang="en-US"/>
           </a:p>
@@ -2905,7 +2910,7 @@
           <a:p>
             <a:fld id="{9244CCC5-76A4-4057-B5CC-077AFF00554F}" type="datetimeFigureOut">
               <a:rPr lang="en-US" smtClean="0"/>
-              <a:t>10/20/2020</a:t>
+              <a:t>10/30/2020</a:t>
             </a:fld>
             <a:endParaRPr lang="en-US"/>
           </a:p>
@@ -3945,7 +3950,7 @@
         <p:spPr>
           <a:xfrm>
             <a:off x="8181242" y="423496"/>
-            <a:ext cx="3152042" cy="2972702"/>
+            <a:ext cx="3152042" cy="3133436"/>
           </a:xfrm>
           <a:prstGeom prst="rect">
             <a:avLst/>
@@ -4035,7 +4040,7 @@
         <p:spPr>
           <a:xfrm>
             <a:off x="303334" y="1857330"/>
-            <a:ext cx="2784233" cy="769441"/>
+            <a:ext cx="2784233" cy="938719"/>
           </a:xfrm>
           <a:prstGeom prst="rect">
             <a:avLst/>
@@ -4064,7 +4069,7 @@
             </a:pPr>
             <a:r>
               <a:rPr lang="en-US" sz="1100" i="1" dirty="0"/>
-              <a:t>Email survey? (talk to people who have previously done email surveys with folks about academic publishing)</a:t>
+              <a:t>Email survey? (talk to people who have previously done email surveys with folks about academic publishing, e.g. doi.org/10.7554/eLife.54097)</a:t>
             </a:r>
           </a:p>
         </p:txBody>

</xml_diff>